<commit_message>
Some minor final tweaks
</commit_message>
<xml_diff>
--- a/presentation/Presentation.pptx
+++ b/presentation/Presentation.pptx
@@ -5,7 +5,7 @@
     <p:sldMasterId id="2147483648" r:id="rId1"/>
   </p:sldMasterIdLst>
   <p:notesMasterIdLst>
-    <p:notesMasterId r:id="rId15"/>
+    <p:notesMasterId r:id="rId16"/>
   </p:notesMasterIdLst>
   <p:sldIdLst>
     <p:sldId id="256" r:id="rId2"/>
@@ -18,9 +18,10 @@
     <p:sldId id="264" r:id="rId9"/>
     <p:sldId id="267" r:id="rId10"/>
     <p:sldId id="265" r:id="rId11"/>
-    <p:sldId id="268" r:id="rId12"/>
-    <p:sldId id="269" r:id="rId13"/>
-    <p:sldId id="270" r:id="rId14"/>
+    <p:sldId id="271" r:id="rId12"/>
+    <p:sldId id="268" r:id="rId13"/>
+    <p:sldId id="269" r:id="rId14"/>
+    <p:sldId id="270" r:id="rId15"/>
   </p:sldIdLst>
   <p:sldSz cx="12192000" cy="6858000"/>
   <p:notesSz cx="6858000" cy="9144000"/>
@@ -212,7 +213,7 @@
           <a:p>
             <a:fld id="{E572BB43-A200-414A-BE67-08E110001A8B}" type="datetimeFigureOut">
               <a:rPr lang="de-LU" smtClean="0"/>
-              <a:t>07.01.2016</a:t>
+              <a:t>08.01.2016</a:t>
             </a:fld>
             <a:endParaRPr lang="de-LU"/>
           </a:p>
@@ -619,7 +620,7 @@
           <a:p>
             <a:fld id="{BB4DBA3A-11EB-4DEA-A3A8-C4E3887F0401}" type="datetimeFigureOut">
               <a:rPr lang="de-LU" smtClean="0"/>
-              <a:t>07.01.2016</a:t>
+              <a:t>08.01.2016</a:t>
             </a:fld>
             <a:endParaRPr lang="de-LU"/>
           </a:p>
@@ -813,7 +814,7 @@
           <a:p>
             <a:fld id="{BB4DBA3A-11EB-4DEA-A3A8-C4E3887F0401}" type="datetimeFigureOut">
               <a:rPr lang="de-LU" smtClean="0"/>
-              <a:t>07.01.2016</a:t>
+              <a:t>08.01.2016</a:t>
             </a:fld>
             <a:endParaRPr lang="de-LU"/>
           </a:p>
@@ -1106,7 +1107,7 @@
           <a:p>
             <a:fld id="{BB4DBA3A-11EB-4DEA-A3A8-C4E3887F0401}" type="datetimeFigureOut">
               <a:rPr lang="de-LU" smtClean="0"/>
-              <a:t>07.01.2016</a:t>
+              <a:t>08.01.2016</a:t>
             </a:fld>
             <a:endParaRPr lang="de-LU"/>
           </a:p>
@@ -1394,7 +1395,7 @@
           <a:p>
             <a:fld id="{BB4DBA3A-11EB-4DEA-A3A8-C4E3887F0401}" type="datetimeFigureOut">
               <a:rPr lang="de-LU" smtClean="0"/>
-              <a:t>07.01.2016</a:t>
+              <a:t>08.01.2016</a:t>
             </a:fld>
             <a:endParaRPr lang="de-LU"/>
           </a:p>
@@ -1753,7 +1754,7 @@
           <a:p>
             <a:fld id="{BB4DBA3A-11EB-4DEA-A3A8-C4E3887F0401}" type="datetimeFigureOut">
               <a:rPr lang="de-LU" smtClean="0"/>
-              <a:t>07.01.2016</a:t>
+              <a:t>08.01.2016</a:t>
             </a:fld>
             <a:endParaRPr lang="de-LU"/>
           </a:p>
@@ -2009,7 +2010,7 @@
           <a:p>
             <a:fld id="{BB4DBA3A-11EB-4DEA-A3A8-C4E3887F0401}" type="datetimeFigureOut">
               <a:rPr lang="de-LU" smtClean="0"/>
-              <a:t>07.01.2016</a:t>
+              <a:t>08.01.2016</a:t>
             </a:fld>
             <a:endParaRPr lang="de-LU"/>
           </a:p>
@@ -2489,7 +2490,7 @@
           <a:p>
             <a:fld id="{BB4DBA3A-11EB-4DEA-A3A8-C4E3887F0401}" type="datetimeFigureOut">
               <a:rPr lang="de-LU" smtClean="0"/>
-              <a:t>07.01.2016</a:t>
+              <a:t>08.01.2016</a:t>
             </a:fld>
             <a:endParaRPr lang="de-LU"/>
           </a:p>
@@ -2720,7 +2721,7 @@
           <a:p>
             <a:fld id="{BB4DBA3A-11EB-4DEA-A3A8-C4E3887F0401}" type="datetimeFigureOut">
               <a:rPr lang="de-LU" smtClean="0"/>
-              <a:t>07.01.2016</a:t>
+              <a:t>08.01.2016</a:t>
             </a:fld>
             <a:endParaRPr lang="de-LU"/>
           </a:p>
@@ -2928,7 +2929,7 @@
           <a:p>
             <a:fld id="{BB4DBA3A-11EB-4DEA-A3A8-C4E3887F0401}" type="datetimeFigureOut">
               <a:rPr lang="de-LU" smtClean="0"/>
-              <a:t>07.01.2016</a:t>
+              <a:t>08.01.2016</a:t>
             </a:fld>
             <a:endParaRPr lang="de-LU"/>
           </a:p>
@@ -3318,7 +3319,7 @@
           <a:p>
             <a:fld id="{BB4DBA3A-11EB-4DEA-A3A8-C4E3887F0401}" type="datetimeFigureOut">
               <a:rPr lang="de-LU" smtClean="0"/>
-              <a:t>07.01.2016</a:t>
+              <a:t>08.01.2016</a:t>
             </a:fld>
             <a:endParaRPr lang="de-LU"/>
           </a:p>
@@ -3684,7 +3685,7 @@
           <a:p>
             <a:fld id="{BB4DBA3A-11EB-4DEA-A3A8-C4E3887F0401}" type="datetimeFigureOut">
               <a:rPr lang="de-LU" smtClean="0"/>
-              <a:t>07.01.2016</a:t>
+              <a:t>08.01.2016</a:t>
             </a:fld>
             <a:endParaRPr lang="de-LU"/>
           </a:p>
@@ -4481,8 +4482,13 @@
           <a:p>
             <a:r>
               <a:rPr lang="de-LU" dirty="0" smtClean="0"/>
-              <a:t>3 Visualisierungsarten:</a:t>
-            </a:r>
+              <a:t>3 </a:t>
+            </a:r>
+            <a:r>
+              <a:rPr lang="de-LU" dirty="0" smtClean="0"/>
+              <a:t>Visualisierungsarten</a:t>
+            </a:r>
+            <a:endParaRPr lang="de-LU" dirty="0" smtClean="0"/>
           </a:p>
           <a:p>
             <a:pPr lvl="1"/>
@@ -4639,7 +4645,7 @@
       </p:grpSpPr>
       <p:sp>
         <p:nvSpPr>
-          <p:cNvPr id="4" name="Titel 3"/>
+          <p:cNvPr id="2" name="Titel 1"/>
           <p:cNvSpPr>
             <a:spLocks noGrp="1"/>
           </p:cNvSpPr>
@@ -4653,42 +4659,795 @@
           <a:lstStyle/>
           <a:p>
             <a:r>
-              <a:rPr lang="de-LU" dirty="0" smtClean="0"/>
-              <a:t>LIVE PRÄSENTATION</a:t>
-            </a:r>
-            <a:endParaRPr lang="de-LU" dirty="0"/>
-          </a:p>
-        </p:txBody>
-      </p:sp>
-      <p:sp>
-        <p:nvSpPr>
-          <p:cNvPr id="5" name="Textplatzhalter 4"/>
-          <p:cNvSpPr>
-            <a:spLocks noGrp="1"/>
-          </p:cNvSpPr>
-          <p:nvPr>
-            <p:ph type="body" idx="1"/>
-          </p:nvPr>
-        </p:nvSpPr>
-        <p:spPr/>
-        <p:txBody>
-          <a:bodyPr/>
-          <a:lstStyle/>
-          <a:p>
-            <a:endParaRPr lang="de-LU" dirty="0"/>
-          </a:p>
-        </p:txBody>
-      </p:sp>
+              <a:rPr lang="de-LU" dirty="0"/>
+              <a:t>Funktionen und Features</a:t>
+            </a:r>
+            <a:endParaRPr lang="de-AT" dirty="0"/>
+          </a:p>
+        </p:txBody>
+      </p:sp>
+      <p:graphicFrame>
+        <p:nvGraphicFramePr>
+          <p:cNvPr id="4" name="Inhaltsplatzhalter 3"/>
+          <p:cNvGraphicFramePr>
+            <a:graphicFrameLocks noGrp="1"/>
+          </p:cNvGraphicFramePr>
+          <p:nvPr>
+            <p:ph idx="1"/>
+            <p:extLst>
+              <p:ext uri="{D42A27DB-BD31-4B8C-83A1-F6EECF244321}">
+                <p14:modId xmlns:p14="http://schemas.microsoft.com/office/powerpoint/2010/main" val="2883884411"/>
+              </p:ext>
+            </p:extLst>
+          </p:nvPr>
+        </p:nvGraphicFramePr>
+        <p:xfrm>
+          <a:off x="838200" y="1378153"/>
+          <a:ext cx="10515600" cy="2011680"/>
+        </p:xfrm>
+        <a:graphic>
+          <a:graphicData uri="http://schemas.openxmlformats.org/drawingml/2006/table">
+            <a:tbl>
+              <a:tblPr firstRow="1" bandRow="1">
+                <a:tableStyleId>{5C22544A-7EE6-4342-B048-85BDC9FD1C3A}</a:tableStyleId>
+              </a:tblPr>
+              <a:tblGrid>
+                <a:gridCol w="5257800">
+                  <a:extLst>
+                    <a:ext uri="{9D8B030D-6E8A-4147-A177-3AD203B41FA5}">
+                      <a16:colId xmlns:a16="http://schemas.microsoft.com/office/drawing/2014/main" val="1598917254"/>
+                    </a:ext>
+                  </a:extLst>
+                </a:gridCol>
+                <a:gridCol w="5257800">
+                  <a:extLst>
+                    <a:ext uri="{9D8B030D-6E8A-4147-A177-3AD203B41FA5}">
+                      <a16:colId xmlns:a16="http://schemas.microsoft.com/office/drawing/2014/main" val="1179253324"/>
+                    </a:ext>
+                  </a:extLst>
+                </a:gridCol>
+              </a:tblGrid>
+              <a:tr h="311814">
+                <a:tc gridSpan="2">
+                  <a:txBody>
+                    <a:bodyPr/>
+                    <a:lstStyle/>
+                    <a:p>
+                      <a:r>
+                        <a:rPr lang="de-AT" sz="1600" dirty="0" smtClean="0"/>
+                        <a:t>Kategorie 1</a:t>
+                      </a:r>
+                      <a:endParaRPr lang="de-AT" sz="1600" dirty="0"/>
+                    </a:p>
+                  </a:txBody>
+                  <a:tcPr/>
+                </a:tc>
+                <a:tc hMerge="1">
+                  <a:txBody>
+                    <a:bodyPr/>
+                    <a:lstStyle/>
+                    <a:p>
+                      <a:endParaRPr lang="de-AT" dirty="0"/>
+                    </a:p>
+                  </a:txBody>
+                  <a:tcPr/>
+                </a:tc>
+                <a:extLst>
+                  <a:ext uri="{0D108BD9-81ED-4DB2-BD59-A6C34878D82A}">
+                    <a16:rowId xmlns:a16="http://schemas.microsoft.com/office/drawing/2014/main" val="1149136264"/>
+                  </a:ext>
+                </a:extLst>
+              </a:tr>
+              <a:tr h="311814">
+                <a:tc>
+                  <a:txBody>
+                    <a:bodyPr/>
+                    <a:lstStyle/>
+                    <a:p>
+                      <a:r>
+                        <a:rPr lang="de-AT" sz="1600" dirty="0" err="1" smtClean="0"/>
+                        <a:t>Gaussian</a:t>
+                      </a:r>
+                      <a:r>
+                        <a:rPr lang="de-AT" sz="1600" dirty="0" smtClean="0"/>
+                        <a:t> </a:t>
+                      </a:r>
+                      <a:r>
+                        <a:rPr lang="de-AT" sz="1600" dirty="0" err="1" smtClean="0"/>
+                        <a:t>filtering</a:t>
+                      </a:r>
+                      <a:endParaRPr lang="de-AT" sz="1600" dirty="0"/>
+                    </a:p>
+                  </a:txBody>
+                  <a:tcPr/>
+                </a:tc>
+                <a:tc>
+                  <a:txBody>
+                    <a:bodyPr/>
+                    <a:lstStyle/>
+                    <a:p>
+                      <a:r>
+                        <a:rPr lang="de-AT" sz="1600" dirty="0" smtClean="0"/>
+                        <a:t>+5 </a:t>
+                      </a:r>
+                      <a:r>
+                        <a:rPr lang="de-AT" sz="1600" dirty="0" err="1" smtClean="0"/>
+                        <a:t>Pts</a:t>
+                      </a:r>
+                      <a:endParaRPr lang="de-AT" sz="1600" dirty="0"/>
+                    </a:p>
+                  </a:txBody>
+                  <a:tcPr/>
+                </a:tc>
+                <a:extLst>
+                  <a:ext uri="{0D108BD9-81ED-4DB2-BD59-A6C34878D82A}">
+                    <a16:rowId xmlns:a16="http://schemas.microsoft.com/office/drawing/2014/main" val="3252329574"/>
+                  </a:ext>
+                </a:extLst>
+              </a:tr>
+              <a:tr h="311814">
+                <a:tc>
+                  <a:txBody>
+                    <a:bodyPr/>
+                    <a:lstStyle/>
+                    <a:p>
+                      <a:r>
+                        <a:rPr lang="de-AT" sz="1600" dirty="0" smtClean="0"/>
+                        <a:t>Median </a:t>
+                      </a:r>
+                      <a:r>
+                        <a:rPr lang="de-AT" sz="1600" dirty="0" err="1" smtClean="0"/>
+                        <a:t>filtering</a:t>
+                      </a:r>
+                      <a:endParaRPr lang="de-AT" sz="1600" dirty="0"/>
+                    </a:p>
+                  </a:txBody>
+                  <a:tcPr/>
+                </a:tc>
+                <a:tc>
+                  <a:txBody>
+                    <a:bodyPr/>
+                    <a:lstStyle/>
+                    <a:p>
+                      <a:pPr marL="0" marR="0" indent="0" algn="l" defTabSz="914400" rtl="0" eaLnBrk="1" fontAlgn="auto" latinLnBrk="0" hangingPunct="1">
+                        <a:lnSpc>
+                          <a:spcPct val="100000"/>
+                        </a:lnSpc>
+                        <a:spcBef>
+                          <a:spcPts val="0"/>
+                        </a:spcBef>
+                        <a:spcAft>
+                          <a:spcPts val="0"/>
+                        </a:spcAft>
+                        <a:buClrTx/>
+                        <a:buSzTx/>
+                        <a:buFontTx/>
+                        <a:buNone/>
+                        <a:tabLst/>
+                        <a:defRPr/>
+                      </a:pPr>
+                      <a:r>
+                        <a:rPr lang="de-AT" sz="1600" dirty="0" smtClean="0"/>
+                        <a:t>+5 </a:t>
+                      </a:r>
+                      <a:r>
+                        <a:rPr lang="de-AT" sz="1600" dirty="0" err="1" smtClean="0"/>
+                        <a:t>Pts</a:t>
+                      </a:r>
+                      <a:endParaRPr lang="de-AT" sz="1600" dirty="0" smtClean="0"/>
+                    </a:p>
+                  </a:txBody>
+                  <a:tcPr/>
+                </a:tc>
+                <a:extLst>
+                  <a:ext uri="{0D108BD9-81ED-4DB2-BD59-A6C34878D82A}">
+                    <a16:rowId xmlns:a16="http://schemas.microsoft.com/office/drawing/2014/main" val="2002456361"/>
+                  </a:ext>
+                </a:extLst>
+              </a:tr>
+              <a:tr h="311814">
+                <a:tc>
+                  <a:txBody>
+                    <a:bodyPr/>
+                    <a:lstStyle/>
+                    <a:p>
+                      <a:r>
+                        <a:rPr lang="de-AT" sz="1600" dirty="0" smtClean="0"/>
+                        <a:t>Orthogonal </a:t>
+                      </a:r>
+                      <a:r>
+                        <a:rPr lang="de-AT" sz="1600" dirty="0" err="1" smtClean="0"/>
+                        <a:t>slices</a:t>
+                      </a:r>
+                      <a:endParaRPr lang="de-AT" sz="1600" dirty="0"/>
+                    </a:p>
+                  </a:txBody>
+                  <a:tcPr/>
+                </a:tc>
+                <a:tc>
+                  <a:txBody>
+                    <a:bodyPr/>
+                    <a:lstStyle/>
+                    <a:p>
+                      <a:pPr marL="0" marR="0" indent="0" algn="l" defTabSz="914400" rtl="0" eaLnBrk="1" fontAlgn="auto" latinLnBrk="0" hangingPunct="1">
+                        <a:lnSpc>
+                          <a:spcPct val="100000"/>
+                        </a:lnSpc>
+                        <a:spcBef>
+                          <a:spcPts val="0"/>
+                        </a:spcBef>
+                        <a:spcAft>
+                          <a:spcPts val="0"/>
+                        </a:spcAft>
+                        <a:buClrTx/>
+                        <a:buSzTx/>
+                        <a:buFontTx/>
+                        <a:buNone/>
+                        <a:tabLst/>
+                        <a:defRPr/>
+                      </a:pPr>
+                      <a:r>
+                        <a:rPr lang="de-AT" sz="1600" dirty="0" smtClean="0"/>
+                        <a:t>+5 </a:t>
+                      </a:r>
+                      <a:r>
+                        <a:rPr lang="de-AT" sz="1600" dirty="0" err="1" smtClean="0"/>
+                        <a:t>Pts</a:t>
+                      </a:r>
+                      <a:endParaRPr lang="de-AT" sz="1600" dirty="0" smtClean="0"/>
+                    </a:p>
+                  </a:txBody>
+                  <a:tcPr/>
+                </a:tc>
+                <a:extLst>
+                  <a:ext uri="{0D108BD9-81ED-4DB2-BD59-A6C34878D82A}">
+                    <a16:rowId xmlns:a16="http://schemas.microsoft.com/office/drawing/2014/main" val="3563447959"/>
+                  </a:ext>
+                </a:extLst>
+              </a:tr>
+              <a:tr h="311814">
+                <a:tc>
+                  <a:txBody>
+                    <a:bodyPr/>
+                    <a:lstStyle/>
+                    <a:p>
+                      <a:r>
+                        <a:rPr lang="de-AT" sz="1600" dirty="0" smtClean="0"/>
+                        <a:t>Maximum </a:t>
+                      </a:r>
+                      <a:r>
+                        <a:rPr lang="de-AT" sz="1600" dirty="0" err="1" smtClean="0"/>
+                        <a:t>Itensity</a:t>
+                      </a:r>
+                      <a:r>
+                        <a:rPr lang="de-AT" sz="1600" baseline="0" dirty="0" smtClean="0"/>
+                        <a:t> </a:t>
+                      </a:r>
+                      <a:r>
+                        <a:rPr lang="de-AT" sz="1600" baseline="0" dirty="0" err="1" smtClean="0"/>
+                        <a:t>Projection</a:t>
+                      </a:r>
+                      <a:endParaRPr lang="de-AT" sz="1600" dirty="0"/>
+                    </a:p>
+                  </a:txBody>
+                  <a:tcPr/>
+                </a:tc>
+                <a:tc>
+                  <a:txBody>
+                    <a:bodyPr/>
+                    <a:lstStyle/>
+                    <a:p>
+                      <a:pPr marL="0" marR="0" indent="0" algn="l" defTabSz="914400" rtl="0" eaLnBrk="1" fontAlgn="auto" latinLnBrk="0" hangingPunct="1">
+                        <a:lnSpc>
+                          <a:spcPct val="100000"/>
+                        </a:lnSpc>
+                        <a:spcBef>
+                          <a:spcPts val="0"/>
+                        </a:spcBef>
+                        <a:spcAft>
+                          <a:spcPts val="0"/>
+                        </a:spcAft>
+                        <a:buClrTx/>
+                        <a:buSzTx/>
+                        <a:buFontTx/>
+                        <a:buNone/>
+                        <a:tabLst/>
+                        <a:defRPr/>
+                      </a:pPr>
+                      <a:r>
+                        <a:rPr lang="de-AT" sz="1600" dirty="0" smtClean="0"/>
+                        <a:t>+5 </a:t>
+                      </a:r>
+                      <a:r>
+                        <a:rPr lang="de-AT" sz="1600" dirty="0" err="1" smtClean="0"/>
+                        <a:t>Pts</a:t>
+                      </a:r>
+                      <a:endParaRPr lang="de-AT" sz="1600" dirty="0" smtClean="0"/>
+                    </a:p>
+                  </a:txBody>
+                  <a:tcPr/>
+                </a:tc>
+                <a:extLst>
+                  <a:ext uri="{0D108BD9-81ED-4DB2-BD59-A6C34878D82A}">
+                    <a16:rowId xmlns:a16="http://schemas.microsoft.com/office/drawing/2014/main" val="1917244787"/>
+                  </a:ext>
+                </a:extLst>
+              </a:tr>
+              <a:tr h="311814">
+                <a:tc>
+                  <a:txBody>
+                    <a:bodyPr/>
+                    <a:lstStyle/>
+                    <a:p>
+                      <a:r>
+                        <a:rPr lang="de-AT" sz="1600" dirty="0" err="1" smtClean="0"/>
+                        <a:t>Windowing</a:t>
+                      </a:r>
+                      <a:r>
+                        <a:rPr lang="de-AT" sz="1600" dirty="0" smtClean="0"/>
+                        <a:t> </a:t>
+                      </a:r>
+                      <a:r>
+                        <a:rPr lang="de-AT" sz="1600" dirty="0" err="1" smtClean="0"/>
+                        <a:t>Function</a:t>
+                      </a:r>
+                      <a:endParaRPr lang="de-AT" sz="1600" dirty="0"/>
+                    </a:p>
+                  </a:txBody>
+                  <a:tcPr/>
+                </a:tc>
+                <a:tc>
+                  <a:txBody>
+                    <a:bodyPr/>
+                    <a:lstStyle/>
+                    <a:p>
+                      <a:pPr marL="0" marR="0" indent="0" algn="l" defTabSz="914400" rtl="0" eaLnBrk="1" fontAlgn="auto" latinLnBrk="0" hangingPunct="1">
+                        <a:lnSpc>
+                          <a:spcPct val="100000"/>
+                        </a:lnSpc>
+                        <a:spcBef>
+                          <a:spcPts val="0"/>
+                        </a:spcBef>
+                        <a:spcAft>
+                          <a:spcPts val="0"/>
+                        </a:spcAft>
+                        <a:buClrTx/>
+                        <a:buSzTx/>
+                        <a:buFontTx/>
+                        <a:buNone/>
+                        <a:tabLst/>
+                        <a:defRPr/>
+                      </a:pPr>
+                      <a:r>
+                        <a:rPr lang="de-AT" sz="1600" dirty="0" smtClean="0"/>
+                        <a:t>+5 </a:t>
+                      </a:r>
+                      <a:r>
+                        <a:rPr lang="de-AT" sz="1600" dirty="0" err="1" smtClean="0"/>
+                        <a:t>Pts</a:t>
+                      </a:r>
+                      <a:endParaRPr lang="de-AT" sz="1600" dirty="0" smtClean="0"/>
+                    </a:p>
+                  </a:txBody>
+                  <a:tcPr/>
+                </a:tc>
+                <a:extLst>
+                  <a:ext uri="{0D108BD9-81ED-4DB2-BD59-A6C34878D82A}">
+                    <a16:rowId xmlns:a16="http://schemas.microsoft.com/office/drawing/2014/main" val="4197467407"/>
+                  </a:ext>
+                </a:extLst>
+              </a:tr>
+            </a:tbl>
+          </a:graphicData>
+        </a:graphic>
+      </p:graphicFrame>
+      <p:graphicFrame>
+        <p:nvGraphicFramePr>
+          <p:cNvPr id="5" name="Tabelle 4"/>
+          <p:cNvGraphicFramePr>
+            <a:graphicFrameLocks noGrp="1"/>
+          </p:cNvGraphicFramePr>
+          <p:nvPr>
+            <p:extLst>
+              <p:ext uri="{D42A27DB-BD31-4B8C-83A1-F6EECF244321}">
+                <p14:modId xmlns:p14="http://schemas.microsoft.com/office/powerpoint/2010/main" val="3858325008"/>
+              </p:ext>
+            </p:extLst>
+          </p:nvPr>
+        </p:nvGraphicFramePr>
+        <p:xfrm>
+          <a:off x="838200" y="3524770"/>
+          <a:ext cx="10515600" cy="670560"/>
+        </p:xfrm>
+        <a:graphic>
+          <a:graphicData uri="http://schemas.openxmlformats.org/drawingml/2006/table">
+            <a:tbl>
+              <a:tblPr firstRow="1" bandRow="1">
+                <a:tableStyleId>{5C22544A-7EE6-4342-B048-85BDC9FD1C3A}</a:tableStyleId>
+              </a:tblPr>
+              <a:tblGrid>
+                <a:gridCol w="5257800">
+                  <a:extLst>
+                    <a:ext uri="{9D8B030D-6E8A-4147-A177-3AD203B41FA5}">
+                      <a16:colId xmlns:a16="http://schemas.microsoft.com/office/drawing/2014/main" val="3798102124"/>
+                    </a:ext>
+                  </a:extLst>
+                </a:gridCol>
+                <a:gridCol w="5257800">
+                  <a:extLst>
+                    <a:ext uri="{9D8B030D-6E8A-4147-A177-3AD203B41FA5}">
+                      <a16:colId xmlns:a16="http://schemas.microsoft.com/office/drawing/2014/main" val="1850700052"/>
+                    </a:ext>
+                  </a:extLst>
+                </a:gridCol>
+              </a:tblGrid>
+              <a:tr h="0">
+                <a:tc gridSpan="2">
+                  <a:txBody>
+                    <a:bodyPr/>
+                    <a:lstStyle/>
+                    <a:p>
+                      <a:r>
+                        <a:rPr lang="de-AT" sz="1600" dirty="0" smtClean="0"/>
+                        <a:t>Kategorie 2</a:t>
+                      </a:r>
+                      <a:endParaRPr lang="de-AT" sz="1600" dirty="0"/>
+                    </a:p>
+                  </a:txBody>
+                  <a:tcPr/>
+                </a:tc>
+                <a:tc hMerge="1">
+                  <a:txBody>
+                    <a:bodyPr/>
+                    <a:lstStyle/>
+                    <a:p>
+                      <a:endParaRPr lang="de-AT" dirty="0"/>
+                    </a:p>
+                  </a:txBody>
+                  <a:tcPr/>
+                </a:tc>
+                <a:extLst>
+                  <a:ext uri="{0D108BD9-81ED-4DB2-BD59-A6C34878D82A}">
+                    <a16:rowId xmlns:a16="http://schemas.microsoft.com/office/drawing/2014/main" val="1448072327"/>
+                  </a:ext>
+                </a:extLst>
+              </a:tr>
+              <a:tr h="0">
+                <a:tc>
+                  <a:txBody>
+                    <a:bodyPr/>
+                    <a:lstStyle/>
+                    <a:p>
+                      <a:r>
+                        <a:rPr lang="de-AT" sz="1600" dirty="0" smtClean="0"/>
+                        <a:t>1D</a:t>
+                      </a:r>
+                      <a:r>
+                        <a:rPr lang="de-AT" sz="1600" baseline="0" dirty="0" smtClean="0"/>
+                        <a:t> </a:t>
+                      </a:r>
+                      <a:r>
+                        <a:rPr lang="de-AT" sz="1600" baseline="0" dirty="0" err="1" smtClean="0"/>
+                        <a:t>transfer</a:t>
+                      </a:r>
+                      <a:r>
+                        <a:rPr lang="de-AT" sz="1600" baseline="0" dirty="0" smtClean="0"/>
+                        <a:t> </a:t>
+                      </a:r>
+                      <a:r>
+                        <a:rPr lang="de-AT" sz="1600" baseline="0" dirty="0" err="1" smtClean="0"/>
+                        <a:t>functions</a:t>
+                      </a:r>
+                      <a:endParaRPr lang="de-AT" sz="1600" dirty="0"/>
+                    </a:p>
+                  </a:txBody>
+                  <a:tcPr/>
+                </a:tc>
+                <a:tc>
+                  <a:txBody>
+                    <a:bodyPr/>
+                    <a:lstStyle/>
+                    <a:p>
+                      <a:r>
+                        <a:rPr lang="de-AT" sz="1600" dirty="0" smtClean="0"/>
+                        <a:t>+10</a:t>
+                      </a:r>
+                      <a:r>
+                        <a:rPr lang="de-AT" sz="1600" baseline="0" dirty="0" smtClean="0"/>
+                        <a:t> </a:t>
+                      </a:r>
+                      <a:r>
+                        <a:rPr lang="de-AT" sz="1600" baseline="0" dirty="0" err="1" smtClean="0"/>
+                        <a:t>Pts</a:t>
+                      </a:r>
+                      <a:endParaRPr lang="de-AT" sz="1600" dirty="0" smtClean="0"/>
+                    </a:p>
+                  </a:txBody>
+                  <a:tcPr/>
+                </a:tc>
+                <a:extLst>
+                  <a:ext uri="{0D108BD9-81ED-4DB2-BD59-A6C34878D82A}">
+                    <a16:rowId xmlns:a16="http://schemas.microsoft.com/office/drawing/2014/main" val="819822326"/>
+                  </a:ext>
+                </a:extLst>
+              </a:tr>
+            </a:tbl>
+          </a:graphicData>
+        </a:graphic>
+      </p:graphicFrame>
+      <p:graphicFrame>
+        <p:nvGraphicFramePr>
+          <p:cNvPr id="6" name="Tabelle 5"/>
+          <p:cNvGraphicFramePr>
+            <a:graphicFrameLocks noGrp="1"/>
+          </p:cNvGraphicFramePr>
+          <p:nvPr>
+            <p:extLst>
+              <p:ext uri="{D42A27DB-BD31-4B8C-83A1-F6EECF244321}">
+                <p14:modId xmlns:p14="http://schemas.microsoft.com/office/powerpoint/2010/main" val="1938492956"/>
+              </p:ext>
+            </p:extLst>
+          </p:nvPr>
+        </p:nvGraphicFramePr>
+        <p:xfrm>
+          <a:off x="838200" y="4330267"/>
+          <a:ext cx="10515600" cy="670560"/>
+        </p:xfrm>
+        <a:graphic>
+          <a:graphicData uri="http://schemas.openxmlformats.org/drawingml/2006/table">
+            <a:tbl>
+              <a:tblPr firstRow="1" bandRow="1">
+                <a:tableStyleId>{5C22544A-7EE6-4342-B048-85BDC9FD1C3A}</a:tableStyleId>
+              </a:tblPr>
+              <a:tblGrid>
+                <a:gridCol w="5257800">
+                  <a:extLst>
+                    <a:ext uri="{9D8B030D-6E8A-4147-A177-3AD203B41FA5}">
+                      <a16:colId xmlns:a16="http://schemas.microsoft.com/office/drawing/2014/main" val="3798102124"/>
+                    </a:ext>
+                  </a:extLst>
+                </a:gridCol>
+                <a:gridCol w="5257800">
+                  <a:extLst>
+                    <a:ext uri="{9D8B030D-6E8A-4147-A177-3AD203B41FA5}">
+                      <a16:colId xmlns:a16="http://schemas.microsoft.com/office/drawing/2014/main" val="1850700052"/>
+                    </a:ext>
+                  </a:extLst>
+                </a:gridCol>
+              </a:tblGrid>
+              <a:tr h="0">
+                <a:tc gridSpan="2">
+                  <a:txBody>
+                    <a:bodyPr/>
+                    <a:lstStyle/>
+                    <a:p>
+                      <a:r>
+                        <a:rPr lang="de-AT" sz="1600" dirty="0" smtClean="0"/>
+                        <a:t>Kategorie 3</a:t>
+                      </a:r>
+                      <a:endParaRPr lang="de-AT" sz="1600" dirty="0"/>
+                    </a:p>
+                  </a:txBody>
+                  <a:tcPr/>
+                </a:tc>
+                <a:tc hMerge="1">
+                  <a:txBody>
+                    <a:bodyPr/>
+                    <a:lstStyle/>
+                    <a:p>
+                      <a:endParaRPr lang="de-AT" dirty="0"/>
+                    </a:p>
+                  </a:txBody>
+                  <a:tcPr/>
+                </a:tc>
+                <a:extLst>
+                  <a:ext uri="{0D108BD9-81ED-4DB2-BD59-A6C34878D82A}">
+                    <a16:rowId xmlns:a16="http://schemas.microsoft.com/office/drawing/2014/main" val="1448072327"/>
+                  </a:ext>
+                </a:extLst>
+              </a:tr>
+              <a:tr h="0">
+                <a:tc>
+                  <a:txBody>
+                    <a:bodyPr/>
+                    <a:lstStyle/>
+                    <a:p>
+                      <a:r>
+                        <a:rPr lang="de-AT" sz="1600" baseline="0" dirty="0" err="1" smtClean="0"/>
+                        <a:t>Direct</a:t>
+                      </a:r>
+                      <a:r>
+                        <a:rPr lang="de-AT" sz="1600" baseline="0" dirty="0" smtClean="0"/>
+                        <a:t> </a:t>
+                      </a:r>
+                      <a:r>
+                        <a:rPr lang="de-AT" sz="1600" baseline="0" dirty="0" err="1" smtClean="0"/>
+                        <a:t>volume</a:t>
+                      </a:r>
+                      <a:r>
+                        <a:rPr lang="de-AT" sz="1600" baseline="0" dirty="0" smtClean="0"/>
+                        <a:t> </a:t>
+                      </a:r>
+                      <a:r>
+                        <a:rPr lang="de-AT" sz="1600" baseline="0" dirty="0" err="1" smtClean="0"/>
+                        <a:t>rendering</a:t>
+                      </a:r>
+                      <a:endParaRPr lang="de-AT" sz="1600" dirty="0"/>
+                    </a:p>
+                  </a:txBody>
+                  <a:tcPr/>
+                </a:tc>
+                <a:tc>
+                  <a:txBody>
+                    <a:bodyPr/>
+                    <a:lstStyle/>
+                    <a:p>
+                      <a:r>
+                        <a:rPr lang="de-AT" sz="1600" dirty="0" smtClean="0"/>
+                        <a:t>+10</a:t>
+                      </a:r>
+                      <a:r>
+                        <a:rPr lang="de-AT" sz="1600" baseline="0" dirty="0" smtClean="0"/>
+                        <a:t> </a:t>
+                      </a:r>
+                      <a:r>
+                        <a:rPr lang="de-AT" sz="1600" baseline="0" dirty="0" err="1" smtClean="0"/>
+                        <a:t>Pts</a:t>
+                      </a:r>
+                      <a:endParaRPr lang="de-AT" sz="1600" dirty="0" smtClean="0"/>
+                    </a:p>
+                  </a:txBody>
+                  <a:tcPr/>
+                </a:tc>
+                <a:extLst>
+                  <a:ext uri="{0D108BD9-81ED-4DB2-BD59-A6C34878D82A}">
+                    <a16:rowId xmlns:a16="http://schemas.microsoft.com/office/drawing/2014/main" val="819822326"/>
+                  </a:ext>
+                </a:extLst>
+              </a:tr>
+            </a:tbl>
+          </a:graphicData>
+        </a:graphic>
+      </p:graphicFrame>
+      <p:graphicFrame>
+        <p:nvGraphicFramePr>
+          <p:cNvPr id="7" name="Tabelle 6"/>
+          <p:cNvGraphicFramePr>
+            <a:graphicFrameLocks noGrp="1"/>
+          </p:cNvGraphicFramePr>
+          <p:nvPr>
+            <p:extLst>
+              <p:ext uri="{D42A27DB-BD31-4B8C-83A1-F6EECF244321}">
+                <p14:modId xmlns:p14="http://schemas.microsoft.com/office/powerpoint/2010/main" val="3297504890"/>
+              </p:ext>
+            </p:extLst>
+          </p:nvPr>
+        </p:nvGraphicFramePr>
+        <p:xfrm>
+          <a:off x="838200" y="5135764"/>
+          <a:ext cx="10515600" cy="670560"/>
+        </p:xfrm>
+        <a:graphic>
+          <a:graphicData uri="http://schemas.openxmlformats.org/drawingml/2006/table">
+            <a:tbl>
+              <a:tblPr firstRow="1" bandRow="1">
+                <a:tableStyleId>{5C22544A-7EE6-4342-B048-85BDC9FD1C3A}</a:tableStyleId>
+              </a:tblPr>
+              <a:tblGrid>
+                <a:gridCol w="5257800">
+                  <a:extLst>
+                    <a:ext uri="{9D8B030D-6E8A-4147-A177-3AD203B41FA5}">
+                      <a16:colId xmlns:a16="http://schemas.microsoft.com/office/drawing/2014/main" val="3798102124"/>
+                    </a:ext>
+                  </a:extLst>
+                </a:gridCol>
+                <a:gridCol w="5257800">
+                  <a:extLst>
+                    <a:ext uri="{9D8B030D-6E8A-4147-A177-3AD203B41FA5}">
+                      <a16:colId xmlns:a16="http://schemas.microsoft.com/office/drawing/2014/main" val="1850700052"/>
+                    </a:ext>
+                  </a:extLst>
+                </a:gridCol>
+              </a:tblGrid>
+              <a:tr h="0">
+                <a:tc gridSpan="2">
+                  <a:txBody>
+                    <a:bodyPr/>
+                    <a:lstStyle/>
+                    <a:p>
+                      <a:r>
+                        <a:rPr lang="de-AT" sz="1600" dirty="0" smtClean="0"/>
+                        <a:t>Bonus</a:t>
+                      </a:r>
+                      <a:endParaRPr lang="de-AT" sz="1600" dirty="0"/>
+                    </a:p>
+                  </a:txBody>
+                  <a:tcPr/>
+                </a:tc>
+                <a:tc hMerge="1">
+                  <a:txBody>
+                    <a:bodyPr/>
+                    <a:lstStyle/>
+                    <a:p>
+                      <a:endParaRPr lang="de-AT" dirty="0"/>
+                    </a:p>
+                  </a:txBody>
+                  <a:tcPr/>
+                </a:tc>
+                <a:extLst>
+                  <a:ext uri="{0D108BD9-81ED-4DB2-BD59-A6C34878D82A}">
+                    <a16:rowId xmlns:a16="http://schemas.microsoft.com/office/drawing/2014/main" val="1448072327"/>
+                  </a:ext>
+                </a:extLst>
+              </a:tr>
+              <a:tr h="0">
+                <a:tc>
+                  <a:txBody>
+                    <a:bodyPr/>
+                    <a:lstStyle/>
+                    <a:p>
+                      <a:r>
+                        <a:rPr lang="de-AT" sz="1600" dirty="0" smtClean="0"/>
+                        <a:t>Nice UI </a:t>
+                      </a:r>
+                      <a:r>
+                        <a:rPr lang="de-AT" sz="1600" dirty="0" err="1" smtClean="0"/>
+                        <a:t>widgets</a:t>
+                      </a:r>
+                      <a:r>
+                        <a:rPr lang="de-AT" sz="1600" baseline="0" dirty="0" smtClean="0"/>
+                        <a:t> (?)</a:t>
+                      </a:r>
+                      <a:endParaRPr lang="de-AT" sz="1600" dirty="0"/>
+                    </a:p>
+                  </a:txBody>
+                  <a:tcPr/>
+                </a:tc>
+                <a:tc>
+                  <a:txBody>
+                    <a:bodyPr/>
+                    <a:lstStyle/>
+                    <a:p>
+                      <a:r>
+                        <a:rPr lang="de-AT" sz="1600" dirty="0" smtClean="0"/>
+                        <a:t>+5 </a:t>
+                      </a:r>
+                      <a:r>
+                        <a:rPr lang="de-AT" sz="1600" dirty="0" err="1" smtClean="0"/>
+                        <a:t>Pts</a:t>
+                      </a:r>
+                      <a:endParaRPr lang="de-AT" sz="1600" dirty="0" smtClean="0"/>
+                    </a:p>
+                  </a:txBody>
+                  <a:tcPr/>
+                </a:tc>
+                <a:extLst>
+                  <a:ext uri="{0D108BD9-81ED-4DB2-BD59-A6C34878D82A}">
+                    <a16:rowId xmlns:a16="http://schemas.microsoft.com/office/drawing/2014/main" val="819822326"/>
+                  </a:ext>
+                </a:extLst>
+              </a:tr>
+            </a:tbl>
+          </a:graphicData>
+        </a:graphic>
+      </p:graphicFrame>
     </p:spTree>
     <p:extLst>
       <p:ext uri="{BB962C8B-B14F-4D97-AF65-F5344CB8AC3E}">
-        <p14:creationId xmlns:p14="http://schemas.microsoft.com/office/powerpoint/2010/main" val="1810977164"/>
+        <p14:creationId xmlns:p14="http://schemas.microsoft.com/office/powerpoint/2010/main" val="2570240924"/>
       </p:ext>
     </p:extLst>
   </p:cSld>
   <p:clrMapOvr>
     <a:masterClrMapping/>
   </p:clrMapOvr>
+  <p:timing>
+    <p:tnLst>
+      <p:par>
+        <p:cTn id="1" dur="indefinite" restart="never" nodeType="tmRoot"/>
+      </p:par>
+    </p:tnLst>
+  </p:timing>
 </p:sld>
 </file>
 
@@ -4726,6 +5485,85 @@
           <a:p>
             <a:r>
               <a:rPr lang="de-LU" dirty="0" smtClean="0"/>
+              <a:t>LIVE PRÄSENTATION</a:t>
+            </a:r>
+            <a:endParaRPr lang="de-LU" dirty="0"/>
+          </a:p>
+        </p:txBody>
+      </p:sp>
+      <p:sp>
+        <p:nvSpPr>
+          <p:cNvPr id="5" name="Textplatzhalter 4"/>
+          <p:cNvSpPr>
+            <a:spLocks noGrp="1"/>
+          </p:cNvSpPr>
+          <p:nvPr>
+            <p:ph type="body" idx="1"/>
+          </p:nvPr>
+        </p:nvSpPr>
+        <p:spPr/>
+        <p:txBody>
+          <a:bodyPr/>
+          <a:lstStyle/>
+          <a:p>
+            <a:endParaRPr lang="de-LU" dirty="0"/>
+          </a:p>
+        </p:txBody>
+      </p:sp>
+    </p:spTree>
+    <p:extLst>
+      <p:ext uri="{BB962C8B-B14F-4D97-AF65-F5344CB8AC3E}">
+        <p14:creationId xmlns:p14="http://schemas.microsoft.com/office/powerpoint/2010/main" val="1810977164"/>
+      </p:ext>
+    </p:extLst>
+  </p:cSld>
+  <p:clrMapOvr>
+    <a:masterClrMapping/>
+  </p:clrMapOvr>
+  <p:timing>
+    <p:tnLst>
+      <p:par>
+        <p:cTn id="1" dur="indefinite" restart="never" nodeType="tmRoot"/>
+      </p:par>
+    </p:tnLst>
+  </p:timing>
+</p:sld>
+</file>
+
+<file path=ppt/slides/slide13.xml><?xml version="1.0" encoding="utf-8"?>
+<p:sld xmlns:a="http://schemas.openxmlformats.org/drawingml/2006/main" xmlns:r="http://schemas.openxmlformats.org/officeDocument/2006/relationships" xmlns:p="http://schemas.openxmlformats.org/presentationml/2006/main">
+  <p:cSld>
+    <p:spTree>
+      <p:nvGrpSpPr>
+        <p:cNvPr id="1" name=""/>
+        <p:cNvGrpSpPr/>
+        <p:nvPr/>
+      </p:nvGrpSpPr>
+      <p:grpSpPr>
+        <a:xfrm>
+          <a:off x="0" y="0"/>
+          <a:ext cx="0" cy="0"/>
+          <a:chOff x="0" y="0"/>
+          <a:chExt cx="0" cy="0"/>
+        </a:xfrm>
+      </p:grpSpPr>
+      <p:sp>
+        <p:nvSpPr>
+          <p:cNvPr id="4" name="Titel 3"/>
+          <p:cNvSpPr>
+            <a:spLocks noGrp="1"/>
+          </p:cNvSpPr>
+          <p:nvPr>
+            <p:ph type="title"/>
+          </p:nvPr>
+        </p:nvSpPr>
+        <p:spPr/>
+        <p:txBody>
+          <a:bodyPr/>
+          <a:lstStyle/>
+          <a:p>
+            <a:r>
+              <a:rPr lang="de-LU" dirty="0" smtClean="0"/>
               <a:t>Abschließende Gedanken</a:t>
             </a:r>
             <a:endParaRPr lang="de-LU" dirty="0"/>
@@ -4775,20 +5613,21 @@
             </a:r>
           </a:p>
           <a:p>
-            <a:pPr marL="457200" lvl="1" indent="0">
-              <a:buNone/>
+            <a:pPr lvl="1">
+              <a:buFont typeface="Wingdings" panose="05000000000000000000" pitchFamily="2" charset="2"/>
+              <a:buChar char="à"/>
             </a:pPr>
             <a:r>
               <a:rPr lang="de-LU" dirty="0" smtClean="0">
                 <a:sym typeface="Wingdings" panose="05000000000000000000" pitchFamily="2" charset="2"/>
               </a:rPr>
-              <a:t> </a:t>
-            </a:r>
-            <a:r>
-              <a:rPr lang="de-LU" smtClean="0">
+              <a:t>Keine </a:t>
+            </a:r>
+            <a:r>
+              <a:rPr lang="de-LU" dirty="0" smtClean="0">
                 <a:sym typeface="Wingdings" panose="05000000000000000000" pitchFamily="2" charset="2"/>
               </a:rPr>
-              <a:t>Keine nennenswerten </a:t>
+              <a:t>nennenswerten </a:t>
             </a:r>
             <a:r>
               <a:rPr lang="de-LU" dirty="0" smtClean="0">
@@ -4796,20 +5635,36 @@
               </a:rPr>
               <a:t>Performanceverbesserungen</a:t>
             </a:r>
+          </a:p>
+          <a:p>
+            <a:pPr lvl="1">
+              <a:buFont typeface="Wingdings" panose="05000000000000000000" pitchFamily="2" charset="2"/>
+              <a:buChar char="à"/>
+            </a:pPr>
+            <a:r>
+              <a:rPr lang="de-LU" dirty="0" smtClean="0">
+                <a:sym typeface="Wingdings" panose="05000000000000000000" pitchFamily="2" charset="2"/>
+              </a:rPr>
+              <a:t>Multithreading und </a:t>
+            </a:r>
+            <a:r>
+              <a:rPr lang="de-LU" dirty="0" err="1" smtClean="0">
+                <a:sym typeface="Wingdings" panose="05000000000000000000" pitchFamily="2" charset="2"/>
+              </a:rPr>
+              <a:t>JavaFX</a:t>
+            </a:r>
+            <a:r>
+              <a:rPr lang="de-LU" dirty="0" smtClean="0">
+                <a:sym typeface="Wingdings" panose="05000000000000000000" pitchFamily="2" charset="2"/>
+              </a:rPr>
+              <a:t> GUI Updates = unkomfortable Mischung</a:t>
+            </a:r>
             <a:endParaRPr lang="de-LU" dirty="0" smtClean="0"/>
           </a:p>
           <a:p>
             <a:r>
               <a:rPr lang="de-LU" dirty="0" smtClean="0"/>
-              <a:t>GPU-Implementierungen </a:t>
-            </a:r>
-            <a:r>
-              <a:rPr lang="de-LU" dirty="0" smtClean="0"/>
-              <a:t>w</a:t>
-            </a:r>
-            <a:r>
-              <a:rPr lang="de-LU" dirty="0" smtClean="0"/>
-              <a:t>ünschenswert (besonders bei DVR)</a:t>
+              <a:t>GPU-Implementierungen wünschenswert (besonders bei DVR)</a:t>
             </a:r>
             <a:endParaRPr lang="de-LU" dirty="0"/>
           </a:p>
@@ -4828,7 +5683,7 @@
 </p:sld>
 </file>
 
-<file path=ppt/slides/slide13.xml><?xml version="1.0" encoding="utf-8"?>
+<file path=ppt/slides/slide14.xml><?xml version="1.0" encoding="utf-8"?>
 <p:sld xmlns:a="http://schemas.openxmlformats.org/drawingml/2006/main" xmlns:r="http://schemas.openxmlformats.org/officeDocument/2006/relationships" xmlns:p="http://schemas.openxmlformats.org/presentationml/2006/main">
   <p:cSld>
     <p:spTree>
@@ -4969,8 +5824,9 @@
           <a:p>
             <a:r>
               <a:rPr lang="de-LU" sz="3200" dirty="0" smtClean="0"/>
-              <a:t>Aufbau</a:t>
-            </a:r>
+              <a:t>Architektur und Umsetzung</a:t>
+            </a:r>
+            <a:endParaRPr lang="de-LU" sz="3200" dirty="0" smtClean="0"/>
           </a:p>
           <a:p>
             <a:r>
@@ -5242,42 +6098,38 @@
           </a:p>
           <a:p>
             <a:r>
-              <a:rPr lang="de-LU" dirty="0"/>
-              <a:t>K</a:t>
-            </a:r>
-            <a:r>
               <a:rPr lang="de-LU" dirty="0" smtClean="0"/>
-              <a:t>eine offenen/kostenlosen Java-</a:t>
+              <a:t>Leider keine geeigneten offenen/kostenlosen Java </a:t>
             </a:r>
             <a:r>
               <a:rPr lang="de-LU" dirty="0" err="1" smtClean="0"/>
-              <a:t>Loader</a:t>
+              <a:t>Dicom-Loader</a:t>
             </a:r>
             <a:r>
               <a:rPr lang="de-LU" dirty="0" smtClean="0"/>
-              <a:t> verfügbar, die </a:t>
-            </a:r>
-            <a:r>
-              <a:rPr lang="de-LU" dirty="0" err="1" smtClean="0"/>
-              <a:t>Dicom</a:t>
-            </a:r>
+              <a:t> verfügbar</a:t>
+            </a:r>
+          </a:p>
+          <a:p>
             <a:r>
               <a:rPr lang="de-LU" dirty="0" smtClean="0"/>
-              <a:t>-Bilder-</a:t>
-            </a:r>
-            <a:r>
-              <a:rPr lang="de-LU" dirty="0" err="1" smtClean="0"/>
-              <a:t>Folderloading</a:t>
+              <a:t>Immerhin</a:t>
             </a:r>
             <a:r>
               <a:rPr lang="de-LU" dirty="0" smtClean="0"/>
-              <a:t> unterstützen</a:t>
-            </a:r>
-          </a:p>
-          <a:p>
+              <a:t>: VTK für Linux, </a:t>
+            </a:r>
             <a:r>
               <a:rPr lang="de-LU" dirty="0" smtClean="0"/>
-              <a:t>Immerhin: VTK für Linux, MacOS und Windows verfügbar</a:t>
+              <a:t>OSX</a:t>
+            </a:r>
+            <a:r>
+              <a:rPr lang="de-LU" dirty="0" smtClean="0"/>
+              <a:t> </a:t>
+            </a:r>
+            <a:r>
+              <a:rPr lang="de-LU" dirty="0" smtClean="0"/>
+              <a:t>und Windows verfügbar</a:t>
             </a:r>
             <a:endParaRPr lang="de-LU" dirty="0"/>
           </a:p>
@@ -5345,10 +6197,9 @@
           <a:lstStyle/>
           <a:p>
             <a:r>
-              <a:rPr lang="de-LU" dirty="0" smtClean="0"/>
-              <a:t>Aufbau</a:t>
-            </a:r>
-            <a:endParaRPr lang="de-LU" dirty="0"/>
+              <a:rPr lang="de-LU" dirty="0"/>
+              <a:t>Architektur und Umsetzung</a:t>
+            </a:r>
           </a:p>
         </p:txBody>
       </p:sp>
@@ -5450,10 +6301,9 @@
           <a:lstStyle/>
           <a:p>
             <a:r>
-              <a:rPr lang="de-LU" dirty="0" smtClean="0"/>
-              <a:t>Aufbau</a:t>
-            </a:r>
-            <a:endParaRPr lang="de-LU" dirty="0"/>
+              <a:rPr lang="de-LU" dirty="0"/>
+              <a:t>Architektur und Umsetzung</a:t>
+            </a:r>
           </a:p>
         </p:txBody>
       </p:sp>
@@ -5552,10 +6402,9 @@
           <a:lstStyle/>
           <a:p>
             <a:r>
-              <a:rPr lang="de-LU" dirty="0" smtClean="0"/>
-              <a:t>Aufbau</a:t>
-            </a:r>
-            <a:endParaRPr lang="de-LU" dirty="0"/>
+              <a:rPr lang="de-LU" dirty="0"/>
+              <a:t>Architektur und Umsetzung</a:t>
+            </a:r>
           </a:p>
         </p:txBody>
       </p:sp>
@@ -5693,10 +6542,9 @@
           <a:lstStyle/>
           <a:p>
             <a:r>
-              <a:rPr lang="de-LU" dirty="0" smtClean="0"/>
-              <a:t>Aufbau</a:t>
-            </a:r>
-            <a:endParaRPr lang="de-LU" dirty="0"/>
+              <a:rPr lang="de-LU" dirty="0"/>
+              <a:t>Architektur und Umsetzung</a:t>
+            </a:r>
           </a:p>
         </p:txBody>
       </p:sp>
@@ -5795,10 +6643,9 @@
           <a:lstStyle/>
           <a:p>
             <a:r>
-              <a:rPr lang="de-LU" dirty="0" smtClean="0"/>
-              <a:t>Aufbau</a:t>
-            </a:r>
-            <a:endParaRPr lang="de-LU" dirty="0"/>
+              <a:rPr lang="de-LU" dirty="0"/>
+              <a:t>Architektur und Umsetzung</a:t>
+            </a:r>
           </a:p>
         </p:txBody>
       </p:sp>

</xml_diff>